<commit_message>
Add diagrams to ppt slides
</commit_message>
<xml_diff>
--- a/docs/UML Templates.pptx
+++ b/docs/UML Templates.pptx
@@ -12,6 +12,11 @@
     <p:sldId id="260" r:id="rId6"/>
     <p:sldId id="261" r:id="rId7"/>
     <p:sldId id="262" r:id="rId8"/>
+    <p:sldId id="263" r:id="rId9"/>
+    <p:sldId id="264" r:id="rId10"/>
+    <p:sldId id="265" r:id="rId11"/>
+    <p:sldId id="266" r:id="rId12"/>
+    <p:sldId id="267" r:id="rId13"/>
   </p:sldIdLst>
   <p:sldSz cx="12192000" cy="6858000"/>
   <p:notesSz cx="6858000" cy="9144000"/>
@@ -267,7 +272,7 @@
           <a:p>
             <a:fld id="{3E7EBE13-440A-4FDF-80A1-4172C6B8108E}" type="datetimeFigureOut">
               <a:rPr lang="en-MY" smtClean="0"/>
-              <a:t>3/4/2021</a:t>
+              <a:t>4/4/2021</a:t>
             </a:fld>
             <a:endParaRPr lang="en-MY"/>
           </a:p>
@@ -467,7 +472,7 @@
           <a:p>
             <a:fld id="{3E7EBE13-440A-4FDF-80A1-4172C6B8108E}" type="datetimeFigureOut">
               <a:rPr lang="en-MY" smtClean="0"/>
-              <a:t>3/4/2021</a:t>
+              <a:t>4/4/2021</a:t>
             </a:fld>
             <a:endParaRPr lang="en-MY"/>
           </a:p>
@@ -677,7 +682,7 @@
           <a:p>
             <a:fld id="{3E7EBE13-440A-4FDF-80A1-4172C6B8108E}" type="datetimeFigureOut">
               <a:rPr lang="en-MY" smtClean="0"/>
-              <a:t>3/4/2021</a:t>
+              <a:t>4/4/2021</a:t>
             </a:fld>
             <a:endParaRPr lang="en-MY"/>
           </a:p>
@@ -877,7 +882,7 @@
           <a:p>
             <a:fld id="{3E7EBE13-440A-4FDF-80A1-4172C6B8108E}" type="datetimeFigureOut">
               <a:rPr lang="en-MY" smtClean="0"/>
-              <a:t>3/4/2021</a:t>
+              <a:t>4/4/2021</a:t>
             </a:fld>
             <a:endParaRPr lang="en-MY"/>
           </a:p>
@@ -1153,7 +1158,7 @@
           <a:p>
             <a:fld id="{3E7EBE13-440A-4FDF-80A1-4172C6B8108E}" type="datetimeFigureOut">
               <a:rPr lang="en-MY" smtClean="0"/>
-              <a:t>3/4/2021</a:t>
+              <a:t>4/4/2021</a:t>
             </a:fld>
             <a:endParaRPr lang="en-MY"/>
           </a:p>
@@ -1421,7 +1426,7 @@
           <a:p>
             <a:fld id="{3E7EBE13-440A-4FDF-80A1-4172C6B8108E}" type="datetimeFigureOut">
               <a:rPr lang="en-MY" smtClean="0"/>
-              <a:t>3/4/2021</a:t>
+              <a:t>4/4/2021</a:t>
             </a:fld>
             <a:endParaRPr lang="en-MY"/>
           </a:p>
@@ -1836,7 +1841,7 @@
           <a:p>
             <a:fld id="{3E7EBE13-440A-4FDF-80A1-4172C6B8108E}" type="datetimeFigureOut">
               <a:rPr lang="en-MY" smtClean="0"/>
-              <a:t>3/4/2021</a:t>
+              <a:t>4/4/2021</a:t>
             </a:fld>
             <a:endParaRPr lang="en-MY"/>
           </a:p>
@@ -1978,7 +1983,7 @@
           <a:p>
             <a:fld id="{3E7EBE13-440A-4FDF-80A1-4172C6B8108E}" type="datetimeFigureOut">
               <a:rPr lang="en-MY" smtClean="0"/>
-              <a:t>3/4/2021</a:t>
+              <a:t>4/4/2021</a:t>
             </a:fld>
             <a:endParaRPr lang="en-MY"/>
           </a:p>
@@ -2091,7 +2096,7 @@
           <a:p>
             <a:fld id="{3E7EBE13-440A-4FDF-80A1-4172C6B8108E}" type="datetimeFigureOut">
               <a:rPr lang="en-MY" smtClean="0"/>
-              <a:t>3/4/2021</a:t>
+              <a:t>4/4/2021</a:t>
             </a:fld>
             <a:endParaRPr lang="en-MY"/>
           </a:p>
@@ -2404,7 +2409,7 @@
           <a:p>
             <a:fld id="{3E7EBE13-440A-4FDF-80A1-4172C6B8108E}" type="datetimeFigureOut">
               <a:rPr lang="en-MY" smtClean="0"/>
-              <a:t>3/4/2021</a:t>
+              <a:t>4/4/2021</a:t>
             </a:fld>
             <a:endParaRPr lang="en-MY"/>
           </a:p>
@@ -2693,7 +2698,7 @@
           <a:p>
             <a:fld id="{3E7EBE13-440A-4FDF-80A1-4172C6B8108E}" type="datetimeFigureOut">
               <a:rPr lang="en-MY" smtClean="0"/>
-              <a:t>3/4/2021</a:t>
+              <a:t>4/4/2021</a:t>
             </a:fld>
             <a:endParaRPr lang="en-MY"/>
           </a:p>
@@ -2936,7 +2941,7 @@
           <a:p>
             <a:fld id="{3E7EBE13-440A-4FDF-80A1-4172C6B8108E}" type="datetimeFigureOut">
               <a:rPr lang="en-MY" smtClean="0"/>
-              <a:t>3/4/2021</a:t>
+              <a:t>4/4/2021</a:t>
             </a:fld>
             <a:endParaRPr lang="en-MY"/>
           </a:p>
@@ -4108,6 +4113,339 @@
     <p:extLst>
       <p:ext uri="{BB962C8B-B14F-4D97-AF65-F5344CB8AC3E}">
         <p14:creationId xmlns:p14="http://schemas.microsoft.com/office/powerpoint/2010/main" val="1443715005"/>
+      </p:ext>
+    </p:extLst>
+  </p:cSld>
+  <p:clrMapOvr>
+    <a:masterClrMapping/>
+  </p:clrMapOvr>
+</p:sld>
+</file>
+
+<file path=ppt/slides/slide10.xml><?xml version="1.0" encoding="utf-8"?>
+<p:sld xmlns:a="http://schemas.openxmlformats.org/drawingml/2006/main" xmlns:r="http://schemas.openxmlformats.org/officeDocument/2006/relationships" xmlns:p="http://schemas.openxmlformats.org/presentationml/2006/main">
+  <p:cSld>
+    <p:spTree>
+      <p:nvGrpSpPr>
+        <p:cNvPr id="1" name=""/>
+        <p:cNvGrpSpPr/>
+        <p:nvPr/>
+      </p:nvGrpSpPr>
+      <p:grpSpPr>
+        <a:xfrm>
+          <a:off x="0" y="0"/>
+          <a:ext cx="0" cy="0"/>
+          <a:chOff x="0" y="0"/>
+          <a:chExt cx="0" cy="0"/>
+        </a:xfrm>
+      </p:grpSpPr>
+      <p:pic>
+        <p:nvPicPr>
+          <p:cNvPr id="27" name="Picture 26">
+            <a:extLst>
+              <a:ext uri="{FF2B5EF4-FFF2-40B4-BE49-F238E27FC236}">
+                <a16:creationId xmlns:a16="http://schemas.microsoft.com/office/drawing/2014/main" id="{1D46CB0A-BFB2-4E2B-BC43-EC08F1B59CB7}"/>
+              </a:ext>
+            </a:extLst>
+          </p:cNvPr>
+          <p:cNvPicPr>
+            <a:picLocks noChangeAspect="1"/>
+          </p:cNvPicPr>
+          <p:nvPr/>
+        </p:nvPicPr>
+        <p:blipFill>
+          <a:blip r:embed="rId2"/>
+          <a:stretch>
+            <a:fillRect/>
+          </a:stretch>
+        </p:blipFill>
+        <p:spPr>
+          <a:xfrm>
+            <a:off x="958307" y="657140"/>
+            <a:ext cx="5371042" cy="4883319"/>
+          </a:xfrm>
+          <a:prstGeom prst="rect">
+            <a:avLst/>
+          </a:prstGeom>
+          <a:solidFill>
+            <a:schemeClr val="bg1"/>
+          </a:solidFill>
+        </p:spPr>
+      </p:pic>
+      <p:sp>
+        <p:nvSpPr>
+          <p:cNvPr id="4" name="Rectangle 3">
+            <a:extLst>
+              <a:ext uri="{FF2B5EF4-FFF2-40B4-BE49-F238E27FC236}">
+                <a16:creationId xmlns:a16="http://schemas.microsoft.com/office/drawing/2014/main" id="{BEA7C465-D199-46B0-B516-C253499573BD}"/>
+              </a:ext>
+            </a:extLst>
+          </p:cNvPr>
+          <p:cNvSpPr/>
+          <p:nvPr/>
+        </p:nvSpPr>
+        <p:spPr>
+          <a:xfrm>
+            <a:off x="645557" y="139700"/>
+            <a:ext cx="5996543" cy="5918200"/>
+          </a:xfrm>
+          <a:prstGeom prst="rect">
+            <a:avLst/>
+          </a:prstGeom>
+          <a:noFill/>
+          <a:ln w="25400">
+            <a:solidFill>
+              <a:schemeClr val="tx1"/>
+            </a:solidFill>
+          </a:ln>
+        </p:spPr>
+        <p:style>
+          <a:lnRef idx="2">
+            <a:schemeClr val="accent1">
+              <a:shade val="50000"/>
+            </a:schemeClr>
+          </a:lnRef>
+          <a:fillRef idx="1">
+            <a:schemeClr val="accent1"/>
+          </a:fillRef>
+          <a:effectRef idx="0">
+            <a:schemeClr val="accent1"/>
+          </a:effectRef>
+          <a:fontRef idx="minor">
+            <a:schemeClr val="lt1"/>
+          </a:fontRef>
+        </p:style>
+        <p:txBody>
+          <a:bodyPr rtlCol="0" anchor="ctr"/>
+          <a:lstStyle/>
+          <a:p>
+            <a:pPr algn="ctr"/>
+            <a:endParaRPr lang="en-MY"/>
+          </a:p>
+        </p:txBody>
+      </p:sp>
+    </p:spTree>
+    <p:extLst>
+      <p:ext uri="{BB962C8B-B14F-4D97-AF65-F5344CB8AC3E}">
+        <p14:creationId xmlns:p14="http://schemas.microsoft.com/office/powerpoint/2010/main" val="2247238159"/>
+      </p:ext>
+    </p:extLst>
+  </p:cSld>
+  <p:clrMapOvr>
+    <a:masterClrMapping/>
+  </p:clrMapOvr>
+</p:sld>
+</file>
+
+<file path=ppt/slides/slide11.xml><?xml version="1.0" encoding="utf-8"?>
+<p:sld xmlns:a="http://schemas.openxmlformats.org/drawingml/2006/main" xmlns:r="http://schemas.openxmlformats.org/officeDocument/2006/relationships" xmlns:p="http://schemas.openxmlformats.org/presentationml/2006/main">
+  <p:cSld>
+    <p:spTree>
+      <p:nvGrpSpPr>
+        <p:cNvPr id="1" name=""/>
+        <p:cNvGrpSpPr/>
+        <p:nvPr/>
+      </p:nvGrpSpPr>
+      <p:grpSpPr>
+        <a:xfrm>
+          <a:off x="0" y="0"/>
+          <a:ext cx="0" cy="0"/>
+          <a:chOff x="0" y="0"/>
+          <a:chExt cx="0" cy="0"/>
+        </a:xfrm>
+      </p:grpSpPr>
+      <p:sp>
+        <p:nvSpPr>
+          <p:cNvPr id="5" name="Rectangle 4">
+            <a:extLst>
+              <a:ext uri="{FF2B5EF4-FFF2-40B4-BE49-F238E27FC236}">
+                <a16:creationId xmlns:a16="http://schemas.microsoft.com/office/drawing/2014/main" id="{D6D898DA-FA59-4201-98FA-B8509204B282}"/>
+              </a:ext>
+            </a:extLst>
+          </p:cNvPr>
+          <p:cNvSpPr/>
+          <p:nvPr/>
+        </p:nvSpPr>
+        <p:spPr>
+          <a:xfrm>
+            <a:off x="645557" y="139700"/>
+            <a:ext cx="10220325" cy="5772150"/>
+          </a:xfrm>
+          <a:prstGeom prst="rect">
+            <a:avLst/>
+          </a:prstGeom>
+          <a:solidFill>
+            <a:schemeClr val="bg1"/>
+          </a:solidFill>
+          <a:ln w="25400">
+            <a:solidFill>
+              <a:schemeClr val="tx1">
+                <a:lumMod val="50000"/>
+                <a:lumOff val="50000"/>
+              </a:schemeClr>
+            </a:solidFill>
+          </a:ln>
+        </p:spPr>
+        <p:style>
+          <a:lnRef idx="2">
+            <a:schemeClr val="accent1">
+              <a:shade val="50000"/>
+            </a:schemeClr>
+          </a:lnRef>
+          <a:fillRef idx="1">
+            <a:schemeClr val="accent1"/>
+          </a:fillRef>
+          <a:effectRef idx="0">
+            <a:schemeClr val="accent1"/>
+          </a:effectRef>
+          <a:fontRef idx="minor">
+            <a:schemeClr val="lt1"/>
+          </a:fontRef>
+        </p:style>
+        <p:txBody>
+          <a:bodyPr rtlCol="0" anchor="ctr"/>
+          <a:lstStyle/>
+          <a:p>
+            <a:pPr algn="ctr"/>
+            <a:endParaRPr lang="en-MY"/>
+          </a:p>
+        </p:txBody>
+      </p:sp>
+      <p:pic>
+        <p:nvPicPr>
+          <p:cNvPr id="2" name="Picture 1">
+            <a:extLst>
+              <a:ext uri="{FF2B5EF4-FFF2-40B4-BE49-F238E27FC236}">
+                <a16:creationId xmlns:a16="http://schemas.microsoft.com/office/drawing/2014/main" id="{9B6E9F44-3CF3-4876-8B0C-166B7A14D367}"/>
+              </a:ext>
+            </a:extLst>
+          </p:cNvPr>
+          <p:cNvPicPr>
+            <a:picLocks noChangeAspect="1"/>
+          </p:cNvPicPr>
+          <p:nvPr/>
+        </p:nvPicPr>
+        <p:blipFill>
+          <a:blip r:embed="rId2"/>
+          <a:stretch>
+            <a:fillRect/>
+          </a:stretch>
+        </p:blipFill>
+        <p:spPr>
+          <a:xfrm>
+            <a:off x="3070198" y="584115"/>
+            <a:ext cx="5371042" cy="4883319"/>
+          </a:xfrm>
+          <a:prstGeom prst="rect">
+            <a:avLst/>
+          </a:prstGeom>
+        </p:spPr>
+      </p:pic>
+    </p:spTree>
+    <p:extLst>
+      <p:ext uri="{BB962C8B-B14F-4D97-AF65-F5344CB8AC3E}">
+        <p14:creationId xmlns:p14="http://schemas.microsoft.com/office/powerpoint/2010/main" val="797139357"/>
+      </p:ext>
+    </p:extLst>
+  </p:cSld>
+  <p:clrMapOvr>
+    <a:masterClrMapping/>
+  </p:clrMapOvr>
+</p:sld>
+</file>
+
+<file path=ppt/slides/slide12.xml><?xml version="1.0" encoding="utf-8"?>
+<p:sld xmlns:a="http://schemas.openxmlformats.org/drawingml/2006/main" xmlns:r="http://schemas.openxmlformats.org/officeDocument/2006/relationships" xmlns:p="http://schemas.openxmlformats.org/presentationml/2006/main">
+  <p:cSld>
+    <p:spTree>
+      <p:nvGrpSpPr>
+        <p:cNvPr id="1" name=""/>
+        <p:cNvGrpSpPr/>
+        <p:nvPr/>
+      </p:nvGrpSpPr>
+      <p:grpSpPr>
+        <a:xfrm>
+          <a:off x="0" y="0"/>
+          <a:ext cx="0" cy="0"/>
+          <a:chOff x="0" y="0"/>
+          <a:chExt cx="0" cy="0"/>
+        </a:xfrm>
+      </p:grpSpPr>
+      <p:pic>
+        <p:nvPicPr>
+          <p:cNvPr id="3" name="Picture 2">
+            <a:extLst>
+              <a:ext uri="{FF2B5EF4-FFF2-40B4-BE49-F238E27FC236}">
+                <a16:creationId xmlns:a16="http://schemas.microsoft.com/office/drawing/2014/main" id="{ABD3659B-9F16-4F91-8DBF-9C9949A0F443}"/>
+              </a:ext>
+            </a:extLst>
+          </p:cNvPr>
+          <p:cNvPicPr>
+            <a:picLocks noChangeAspect="1"/>
+          </p:cNvPicPr>
+          <p:nvPr/>
+        </p:nvPicPr>
+        <p:blipFill>
+          <a:blip r:embed="rId2">
+            <a:extLst>
+              <a:ext uri="{28A0092B-C50C-407E-A947-70E740481C1C}">
+                <a14:useLocalDpi xmlns:a14="http://schemas.microsoft.com/office/drawing/2010/main" val="0"/>
+              </a:ext>
+            </a:extLst>
+          </a:blip>
+          <a:stretch>
+            <a:fillRect/>
+          </a:stretch>
+        </p:blipFill>
+        <p:spPr>
+          <a:xfrm>
+            <a:off x="468457" y="142875"/>
+            <a:ext cx="8613630" cy="6572250"/>
+          </a:xfrm>
+          <a:prstGeom prst="rect">
+            <a:avLst/>
+          </a:prstGeom>
+        </p:spPr>
+      </p:pic>
+      <p:sp>
+        <p:nvSpPr>
+          <p:cNvPr id="4" name="TextBox 3">
+            <a:extLst>
+              <a:ext uri="{FF2B5EF4-FFF2-40B4-BE49-F238E27FC236}">
+                <a16:creationId xmlns:a16="http://schemas.microsoft.com/office/drawing/2014/main" id="{541D5A51-4A62-4428-BD7F-13146D93C0F3}"/>
+              </a:ext>
+            </a:extLst>
+          </p:cNvPr>
+          <p:cNvSpPr txBox="1"/>
+          <p:nvPr/>
+        </p:nvSpPr>
+        <p:spPr>
+          <a:xfrm>
+            <a:off x="9991725" y="742950"/>
+            <a:ext cx="2133600" cy="369332"/>
+          </a:xfrm>
+          <a:prstGeom prst="rect">
+            <a:avLst/>
+          </a:prstGeom>
+          <a:noFill/>
+        </p:spPr>
+        <p:txBody>
+          <a:bodyPr wrap="square" rtlCol="0">
+            <a:spAutoFit/>
+          </a:bodyPr>
+          <a:lstStyle/>
+          <a:p>
+            <a:r>
+              <a:rPr lang="en-MY" dirty="0"/>
+              <a:t>Done using </a:t>
+            </a:r>
+          </a:p>
+        </p:txBody>
+      </p:sp>
+    </p:spTree>
+    <p:extLst>
+      <p:ext uri="{BB962C8B-B14F-4D97-AF65-F5344CB8AC3E}">
+        <p14:creationId xmlns:p14="http://schemas.microsoft.com/office/powerpoint/2010/main" val="2736161398"/>
       </p:ext>
     </p:extLst>
   </p:cSld>
@@ -13727,6 +14065,2078 @@
 </p:sld>
 </file>
 
+<file path=ppt/slides/slide8.xml><?xml version="1.0" encoding="utf-8"?>
+<p:sld xmlns:a="http://schemas.openxmlformats.org/drawingml/2006/main" xmlns:r="http://schemas.openxmlformats.org/officeDocument/2006/relationships" xmlns:p="http://schemas.openxmlformats.org/presentationml/2006/main">
+  <p:cSld>
+    <p:spTree>
+      <p:nvGrpSpPr>
+        <p:cNvPr id="1" name=""/>
+        <p:cNvGrpSpPr/>
+        <p:nvPr/>
+      </p:nvGrpSpPr>
+      <p:grpSpPr>
+        <a:xfrm>
+          <a:off x="0" y="0"/>
+          <a:ext cx="0" cy="0"/>
+          <a:chOff x="0" y="0"/>
+          <a:chExt cx="0" cy="0"/>
+        </a:xfrm>
+      </p:grpSpPr>
+      <p:sp>
+        <p:nvSpPr>
+          <p:cNvPr id="4" name="Rectangle 3">
+            <a:extLst>
+              <a:ext uri="{FF2B5EF4-FFF2-40B4-BE49-F238E27FC236}">
+                <a16:creationId xmlns:a16="http://schemas.microsoft.com/office/drawing/2014/main" id="{7A2123F2-A4AF-4DF7-A6DC-AD65E5220AC0}"/>
+              </a:ext>
+            </a:extLst>
+          </p:cNvPr>
+          <p:cNvSpPr/>
+          <p:nvPr/>
+        </p:nvSpPr>
+        <p:spPr>
+          <a:xfrm>
+            <a:off x="1104900" y="1362075"/>
+            <a:ext cx="2466975" cy="2066925"/>
+          </a:xfrm>
+          <a:prstGeom prst="rect">
+            <a:avLst/>
+          </a:prstGeom>
+          <a:noFill/>
+          <a:ln w="25400">
+            <a:solidFill>
+              <a:schemeClr val="tx1"/>
+            </a:solidFill>
+          </a:ln>
+        </p:spPr>
+        <p:style>
+          <a:lnRef idx="2">
+            <a:schemeClr val="accent1">
+              <a:shade val="50000"/>
+            </a:schemeClr>
+          </a:lnRef>
+          <a:fillRef idx="1">
+            <a:schemeClr val="accent1"/>
+          </a:fillRef>
+          <a:effectRef idx="0">
+            <a:schemeClr val="accent1"/>
+          </a:effectRef>
+          <a:fontRef idx="minor">
+            <a:schemeClr val="lt1"/>
+          </a:fontRef>
+        </p:style>
+        <p:txBody>
+          <a:bodyPr rtlCol="0" anchor="ctr"/>
+          <a:lstStyle/>
+          <a:p>
+            <a:pPr algn="ctr"/>
+            <a:endParaRPr lang="en-MY"/>
+          </a:p>
+        </p:txBody>
+      </p:sp>
+      <p:sp>
+        <p:nvSpPr>
+          <p:cNvPr id="5" name="TextBox 4">
+            <a:extLst>
+              <a:ext uri="{FF2B5EF4-FFF2-40B4-BE49-F238E27FC236}">
+                <a16:creationId xmlns:a16="http://schemas.microsoft.com/office/drawing/2014/main" id="{FF9F6A52-D50C-4E72-82C4-BE7E1BA48620}"/>
+              </a:ext>
+            </a:extLst>
+          </p:cNvPr>
+          <p:cNvSpPr txBox="1"/>
+          <p:nvPr/>
+        </p:nvSpPr>
+        <p:spPr>
+          <a:xfrm>
+            <a:off x="4367403" y="1919859"/>
+            <a:ext cx="2557653" cy="646331"/>
+          </a:xfrm>
+          <a:prstGeom prst="rect">
+            <a:avLst/>
+          </a:prstGeom>
+          <a:noFill/>
+        </p:spPr>
+        <p:txBody>
+          <a:bodyPr wrap="square" rtlCol="0">
+            <a:spAutoFit/>
+          </a:bodyPr>
+          <a:lstStyle/>
+          <a:p>
+            <a:r>
+              <a:rPr lang="en-MY" sz="1200" dirty="0">
+                <a:latin typeface="Arial" panose="020B0604020202020204" pitchFamily="34" charset="0"/>
+                <a:cs typeface="Arial" panose="020B0604020202020204" pitchFamily="34" charset="0"/>
+              </a:rPr>
+              <a:t>This is the font to be used.</a:t>
+            </a:r>
+          </a:p>
+          <a:p>
+            <a:r>
+              <a:rPr lang="en-MY" sz="1200" dirty="0">
+                <a:latin typeface="Arial" panose="020B0604020202020204" pitchFamily="34" charset="0"/>
+                <a:cs typeface="Arial" panose="020B0604020202020204" pitchFamily="34" charset="0"/>
+              </a:rPr>
+              <a:t>Font: Arial</a:t>
+            </a:r>
+          </a:p>
+          <a:p>
+            <a:r>
+              <a:rPr lang="en-MY" sz="1200" dirty="0">
+                <a:latin typeface="Arial" panose="020B0604020202020204" pitchFamily="34" charset="0"/>
+                <a:cs typeface="Arial" panose="020B0604020202020204" pitchFamily="34" charset="0"/>
+              </a:rPr>
+              <a:t>Size: 12</a:t>
+            </a:r>
+          </a:p>
+        </p:txBody>
+      </p:sp>
+      <p:cxnSp>
+        <p:nvCxnSpPr>
+          <p:cNvPr id="7" name="Straight Connector 6">
+            <a:extLst>
+              <a:ext uri="{FF2B5EF4-FFF2-40B4-BE49-F238E27FC236}">
+                <a16:creationId xmlns:a16="http://schemas.microsoft.com/office/drawing/2014/main" id="{0C772EFC-5E4B-4A8B-BA9D-F90D80DC925B}"/>
+              </a:ext>
+            </a:extLst>
+          </p:cNvPr>
+          <p:cNvCxnSpPr/>
+          <p:nvPr/>
+        </p:nvCxnSpPr>
+        <p:spPr>
+          <a:xfrm>
+            <a:off x="4367403" y="2952750"/>
+            <a:ext cx="2862072" cy="0"/>
+          </a:xfrm>
+          <a:prstGeom prst="line">
+            <a:avLst/>
+          </a:prstGeom>
+          <a:ln w="25400">
+            <a:solidFill>
+              <a:schemeClr val="tx1"/>
+            </a:solidFill>
+          </a:ln>
+        </p:spPr>
+        <p:style>
+          <a:lnRef idx="1">
+            <a:schemeClr val="accent1"/>
+          </a:lnRef>
+          <a:fillRef idx="0">
+            <a:schemeClr val="accent1"/>
+          </a:fillRef>
+          <a:effectRef idx="0">
+            <a:schemeClr val="accent1"/>
+          </a:effectRef>
+          <a:fontRef idx="minor">
+            <a:schemeClr val="tx1"/>
+          </a:fontRef>
+        </p:style>
+      </p:cxnSp>
+      <p:cxnSp>
+        <p:nvCxnSpPr>
+          <p:cNvPr id="9" name="Straight Arrow Connector 8">
+            <a:extLst>
+              <a:ext uri="{FF2B5EF4-FFF2-40B4-BE49-F238E27FC236}">
+                <a16:creationId xmlns:a16="http://schemas.microsoft.com/office/drawing/2014/main" id="{AE2152FD-BE41-49FD-A03F-E588CB44C071}"/>
+              </a:ext>
+            </a:extLst>
+          </p:cNvPr>
+          <p:cNvCxnSpPr/>
+          <p:nvPr/>
+        </p:nvCxnSpPr>
+        <p:spPr>
+          <a:xfrm>
+            <a:off x="4494276" y="3296920"/>
+            <a:ext cx="2695575" cy="0"/>
+          </a:xfrm>
+          <a:prstGeom prst="straightConnector1">
+            <a:avLst/>
+          </a:prstGeom>
+          <a:ln w="25400">
+            <a:solidFill>
+              <a:schemeClr val="tx1"/>
+            </a:solidFill>
+            <a:tailEnd type="none" w="lg" len="lg"/>
+          </a:ln>
+        </p:spPr>
+        <p:style>
+          <a:lnRef idx="1">
+            <a:schemeClr val="accent1"/>
+          </a:lnRef>
+          <a:fillRef idx="0">
+            <a:schemeClr val="accent1"/>
+          </a:fillRef>
+          <a:effectRef idx="0">
+            <a:schemeClr val="accent1"/>
+          </a:effectRef>
+          <a:fontRef idx="minor">
+            <a:schemeClr val="tx1"/>
+          </a:fontRef>
+        </p:style>
+      </p:cxnSp>
+      <p:cxnSp>
+        <p:nvCxnSpPr>
+          <p:cNvPr id="12" name="Straight Connector 11">
+            <a:extLst>
+              <a:ext uri="{FF2B5EF4-FFF2-40B4-BE49-F238E27FC236}">
+                <a16:creationId xmlns:a16="http://schemas.microsoft.com/office/drawing/2014/main" id="{DA31D2D5-2DE4-48FA-B79A-1A1B0C4B3FBB}"/>
+              </a:ext>
+            </a:extLst>
+          </p:cNvPr>
+          <p:cNvCxnSpPr/>
+          <p:nvPr/>
+        </p:nvCxnSpPr>
+        <p:spPr>
+          <a:xfrm>
+            <a:off x="4407027" y="3619500"/>
+            <a:ext cx="2862072" cy="0"/>
+          </a:xfrm>
+          <a:prstGeom prst="line">
+            <a:avLst/>
+          </a:prstGeom>
+          <a:ln w="25400">
+            <a:solidFill>
+              <a:schemeClr val="tx1"/>
+            </a:solidFill>
+            <a:prstDash val="sysDash"/>
+          </a:ln>
+        </p:spPr>
+        <p:style>
+          <a:lnRef idx="1">
+            <a:schemeClr val="accent1"/>
+          </a:lnRef>
+          <a:fillRef idx="0">
+            <a:schemeClr val="accent1"/>
+          </a:fillRef>
+          <a:effectRef idx="0">
+            <a:schemeClr val="accent1"/>
+          </a:effectRef>
+          <a:fontRef idx="minor">
+            <a:schemeClr val="tx1"/>
+          </a:fontRef>
+        </p:style>
+      </p:cxnSp>
+      <p:cxnSp>
+        <p:nvCxnSpPr>
+          <p:cNvPr id="13" name="Straight Arrow Connector 12">
+            <a:extLst>
+              <a:ext uri="{FF2B5EF4-FFF2-40B4-BE49-F238E27FC236}">
+                <a16:creationId xmlns:a16="http://schemas.microsoft.com/office/drawing/2014/main" id="{895D9635-736E-4F5F-AAF0-223ACE72AA69}"/>
+              </a:ext>
+            </a:extLst>
+          </p:cNvPr>
+          <p:cNvCxnSpPr/>
+          <p:nvPr/>
+        </p:nvCxnSpPr>
+        <p:spPr>
+          <a:xfrm>
+            <a:off x="4533900" y="3963670"/>
+            <a:ext cx="2695575" cy="0"/>
+          </a:xfrm>
+          <a:prstGeom prst="straightConnector1">
+            <a:avLst/>
+          </a:prstGeom>
+          <a:ln w="25400">
+            <a:solidFill>
+              <a:schemeClr val="tx1"/>
+            </a:solidFill>
+            <a:prstDash val="sysDash"/>
+            <a:tailEnd type="none" w="lg" len="lg"/>
+          </a:ln>
+        </p:spPr>
+        <p:style>
+          <a:lnRef idx="1">
+            <a:schemeClr val="accent1"/>
+          </a:lnRef>
+          <a:fillRef idx="0">
+            <a:schemeClr val="accent1"/>
+          </a:fillRef>
+          <a:effectRef idx="0">
+            <a:schemeClr val="accent1"/>
+          </a:effectRef>
+          <a:fontRef idx="minor">
+            <a:schemeClr val="tx1"/>
+          </a:fontRef>
+        </p:style>
+      </p:cxnSp>
+      <p:cxnSp>
+        <p:nvCxnSpPr>
+          <p:cNvPr id="14" name="Straight Arrow Connector 13">
+            <a:extLst>
+              <a:ext uri="{FF2B5EF4-FFF2-40B4-BE49-F238E27FC236}">
+                <a16:creationId xmlns:a16="http://schemas.microsoft.com/office/drawing/2014/main" id="{63AB0F42-41EA-44AD-A848-B09F7C99A075}"/>
+              </a:ext>
+            </a:extLst>
+          </p:cNvPr>
+          <p:cNvCxnSpPr/>
+          <p:nvPr/>
+        </p:nvCxnSpPr>
+        <p:spPr>
+          <a:xfrm>
+            <a:off x="4573524" y="4347718"/>
+            <a:ext cx="2695575" cy="0"/>
+          </a:xfrm>
+          <a:prstGeom prst="straightConnector1">
+            <a:avLst/>
+          </a:prstGeom>
+          <a:ln w="25400">
+            <a:solidFill>
+              <a:schemeClr val="tx1"/>
+            </a:solidFill>
+            <a:prstDash val="sysDash"/>
+            <a:tailEnd type="none" w="lg" len="lg"/>
+          </a:ln>
+        </p:spPr>
+        <p:style>
+          <a:lnRef idx="1">
+            <a:schemeClr val="accent1"/>
+          </a:lnRef>
+          <a:fillRef idx="0">
+            <a:schemeClr val="accent1"/>
+          </a:fillRef>
+          <a:effectRef idx="0">
+            <a:schemeClr val="accent1"/>
+          </a:effectRef>
+          <a:fontRef idx="minor">
+            <a:schemeClr val="tx1"/>
+          </a:fontRef>
+        </p:style>
+      </p:cxnSp>
+      <p:sp>
+        <p:nvSpPr>
+          <p:cNvPr id="15" name="Isosceles Triangle 14">
+            <a:extLst>
+              <a:ext uri="{FF2B5EF4-FFF2-40B4-BE49-F238E27FC236}">
+                <a16:creationId xmlns:a16="http://schemas.microsoft.com/office/drawing/2014/main" id="{37C0B621-D899-4856-9B43-A42BE95395E6}"/>
+              </a:ext>
+            </a:extLst>
+          </p:cNvPr>
+          <p:cNvSpPr>
+            <a:spLocks noChangeAspect="1"/>
+          </p:cNvSpPr>
+          <p:nvPr/>
+        </p:nvSpPr>
+        <p:spPr>
+          <a:xfrm rot="5400000">
+            <a:off x="7269383" y="4254473"/>
+            <a:ext cx="185922" cy="186490"/>
+          </a:xfrm>
+          <a:prstGeom prst="triangle">
+            <a:avLst/>
+          </a:prstGeom>
+          <a:noFill/>
+          <a:ln w="25400">
+            <a:solidFill>
+              <a:schemeClr val="tx1"/>
+            </a:solidFill>
+          </a:ln>
+        </p:spPr>
+        <p:style>
+          <a:lnRef idx="2">
+            <a:schemeClr val="accent1">
+              <a:shade val="50000"/>
+            </a:schemeClr>
+          </a:lnRef>
+          <a:fillRef idx="1">
+            <a:schemeClr val="accent1"/>
+          </a:fillRef>
+          <a:effectRef idx="0">
+            <a:schemeClr val="accent1"/>
+          </a:effectRef>
+          <a:fontRef idx="minor">
+            <a:schemeClr val="lt1"/>
+          </a:fontRef>
+        </p:style>
+        <p:txBody>
+          <a:bodyPr rtlCol="0" anchor="ctr"/>
+          <a:lstStyle/>
+          <a:p>
+            <a:pPr algn="ctr"/>
+            <a:endParaRPr lang="en-MY"/>
+          </a:p>
+        </p:txBody>
+      </p:sp>
+      <p:sp>
+        <p:nvSpPr>
+          <p:cNvPr id="17" name="Isosceles Triangle 16">
+            <a:extLst>
+              <a:ext uri="{FF2B5EF4-FFF2-40B4-BE49-F238E27FC236}">
+                <a16:creationId xmlns:a16="http://schemas.microsoft.com/office/drawing/2014/main" id="{F408D717-8B94-4272-9937-69841B430885}"/>
+              </a:ext>
+            </a:extLst>
+          </p:cNvPr>
+          <p:cNvSpPr>
+            <a:spLocks noChangeAspect="1"/>
+          </p:cNvSpPr>
+          <p:nvPr/>
+        </p:nvSpPr>
+        <p:spPr>
+          <a:xfrm rot="5400000">
+            <a:off x="7240327" y="3870425"/>
+            <a:ext cx="185922" cy="186490"/>
+          </a:xfrm>
+          <a:prstGeom prst="triangle">
+            <a:avLst/>
+          </a:prstGeom>
+          <a:solidFill>
+            <a:schemeClr val="tx1"/>
+          </a:solidFill>
+          <a:ln w="25400">
+            <a:solidFill>
+              <a:schemeClr val="tx1"/>
+            </a:solidFill>
+          </a:ln>
+        </p:spPr>
+        <p:style>
+          <a:lnRef idx="2">
+            <a:schemeClr val="accent1">
+              <a:shade val="50000"/>
+            </a:schemeClr>
+          </a:lnRef>
+          <a:fillRef idx="1">
+            <a:schemeClr val="accent1"/>
+          </a:fillRef>
+          <a:effectRef idx="0">
+            <a:schemeClr val="accent1"/>
+          </a:effectRef>
+          <a:fontRef idx="minor">
+            <a:schemeClr val="lt1"/>
+          </a:fontRef>
+        </p:style>
+        <p:txBody>
+          <a:bodyPr rtlCol="0" anchor="ctr"/>
+          <a:lstStyle/>
+          <a:p>
+            <a:pPr algn="ctr"/>
+            <a:endParaRPr lang="en-MY"/>
+          </a:p>
+        </p:txBody>
+      </p:sp>
+      <p:sp>
+        <p:nvSpPr>
+          <p:cNvPr id="18" name="Isosceles Triangle 17">
+            <a:extLst>
+              <a:ext uri="{FF2B5EF4-FFF2-40B4-BE49-F238E27FC236}">
+                <a16:creationId xmlns:a16="http://schemas.microsoft.com/office/drawing/2014/main" id="{7A971201-9787-4A89-BD32-93161A8884BC}"/>
+              </a:ext>
+            </a:extLst>
+          </p:cNvPr>
+          <p:cNvSpPr>
+            <a:spLocks noChangeAspect="1"/>
+          </p:cNvSpPr>
+          <p:nvPr/>
+        </p:nvSpPr>
+        <p:spPr>
+          <a:xfrm rot="5400000">
+            <a:off x="7190135" y="3206855"/>
+            <a:ext cx="185922" cy="186490"/>
+          </a:xfrm>
+          <a:prstGeom prst="triangle">
+            <a:avLst/>
+          </a:prstGeom>
+          <a:solidFill>
+            <a:schemeClr val="tx1"/>
+          </a:solidFill>
+          <a:ln w="25400">
+            <a:solidFill>
+              <a:schemeClr val="tx1"/>
+            </a:solidFill>
+          </a:ln>
+        </p:spPr>
+        <p:style>
+          <a:lnRef idx="2">
+            <a:schemeClr val="accent1">
+              <a:shade val="50000"/>
+            </a:schemeClr>
+          </a:lnRef>
+          <a:fillRef idx="1">
+            <a:schemeClr val="accent1"/>
+          </a:fillRef>
+          <a:effectRef idx="0">
+            <a:schemeClr val="accent1"/>
+          </a:effectRef>
+          <a:fontRef idx="minor">
+            <a:schemeClr val="lt1"/>
+          </a:fontRef>
+        </p:style>
+        <p:txBody>
+          <a:bodyPr rtlCol="0" anchor="ctr"/>
+          <a:lstStyle/>
+          <a:p>
+            <a:pPr algn="ctr"/>
+            <a:endParaRPr lang="en-MY"/>
+          </a:p>
+        </p:txBody>
+      </p:sp>
+      <p:sp>
+        <p:nvSpPr>
+          <p:cNvPr id="23" name="Oval 22">
+            <a:extLst>
+              <a:ext uri="{FF2B5EF4-FFF2-40B4-BE49-F238E27FC236}">
+                <a16:creationId xmlns:a16="http://schemas.microsoft.com/office/drawing/2014/main" id="{0314F878-058E-4BCB-8593-BD0A469AD1B0}"/>
+              </a:ext>
+            </a:extLst>
+          </p:cNvPr>
+          <p:cNvSpPr>
+            <a:spLocks noChangeAspect="1"/>
+          </p:cNvSpPr>
+          <p:nvPr/>
+        </p:nvSpPr>
+        <p:spPr>
+          <a:xfrm>
+            <a:off x="9153525" y="1304506"/>
+            <a:ext cx="342899" cy="342899"/>
+          </a:xfrm>
+          <a:prstGeom prst="ellipse">
+            <a:avLst/>
+          </a:prstGeom>
+          <a:solidFill>
+            <a:schemeClr val="tx1"/>
+          </a:solidFill>
+          <a:ln>
+            <a:noFill/>
+          </a:ln>
+        </p:spPr>
+        <p:style>
+          <a:lnRef idx="2">
+            <a:schemeClr val="accent1">
+              <a:shade val="50000"/>
+            </a:schemeClr>
+          </a:lnRef>
+          <a:fillRef idx="1">
+            <a:schemeClr val="accent1"/>
+          </a:fillRef>
+          <a:effectRef idx="0">
+            <a:schemeClr val="accent1"/>
+          </a:effectRef>
+          <a:fontRef idx="minor">
+            <a:schemeClr val="lt1"/>
+          </a:fontRef>
+        </p:style>
+        <p:txBody>
+          <a:bodyPr rtlCol="0" anchor="ctr"/>
+          <a:lstStyle/>
+          <a:p>
+            <a:pPr algn="ctr"/>
+            <a:endParaRPr lang="en-MY"/>
+          </a:p>
+        </p:txBody>
+      </p:sp>
+      <p:cxnSp>
+        <p:nvCxnSpPr>
+          <p:cNvPr id="24" name="Straight Connector 23">
+            <a:extLst>
+              <a:ext uri="{FF2B5EF4-FFF2-40B4-BE49-F238E27FC236}">
+                <a16:creationId xmlns:a16="http://schemas.microsoft.com/office/drawing/2014/main" id="{3A3869A3-259C-4FBD-BFA1-A706DA83B3B4}"/>
+              </a:ext>
+            </a:extLst>
+          </p:cNvPr>
+          <p:cNvCxnSpPr>
+            <a:cxnSpLocks/>
+          </p:cNvCxnSpPr>
+          <p:nvPr/>
+        </p:nvCxnSpPr>
+        <p:spPr>
+          <a:xfrm>
+            <a:off x="9324975" y="1590675"/>
+            <a:ext cx="0" cy="652349"/>
+          </a:xfrm>
+          <a:prstGeom prst="line">
+            <a:avLst/>
+          </a:prstGeom>
+          <a:ln w="25400">
+            <a:solidFill>
+              <a:schemeClr val="tx1"/>
+            </a:solidFill>
+          </a:ln>
+        </p:spPr>
+        <p:style>
+          <a:lnRef idx="1">
+            <a:schemeClr val="accent1"/>
+          </a:lnRef>
+          <a:fillRef idx="0">
+            <a:schemeClr val="accent1"/>
+          </a:fillRef>
+          <a:effectRef idx="0">
+            <a:schemeClr val="accent1"/>
+          </a:effectRef>
+          <a:fontRef idx="minor">
+            <a:schemeClr val="tx1"/>
+          </a:fontRef>
+        </p:style>
+      </p:cxnSp>
+      <p:cxnSp>
+        <p:nvCxnSpPr>
+          <p:cNvPr id="27" name="Straight Connector 26">
+            <a:extLst>
+              <a:ext uri="{FF2B5EF4-FFF2-40B4-BE49-F238E27FC236}">
+                <a16:creationId xmlns:a16="http://schemas.microsoft.com/office/drawing/2014/main" id="{46C2AB8D-5611-4C3A-8A30-2314819E8391}"/>
+              </a:ext>
+            </a:extLst>
+          </p:cNvPr>
+          <p:cNvCxnSpPr>
+            <a:cxnSpLocks/>
+          </p:cNvCxnSpPr>
+          <p:nvPr/>
+        </p:nvCxnSpPr>
+        <p:spPr>
+          <a:xfrm>
+            <a:off x="9324975" y="2243024"/>
+            <a:ext cx="211456" cy="393496"/>
+          </a:xfrm>
+          <a:prstGeom prst="line">
+            <a:avLst/>
+          </a:prstGeom>
+          <a:ln w="25400">
+            <a:solidFill>
+              <a:schemeClr val="tx1"/>
+            </a:solidFill>
+          </a:ln>
+        </p:spPr>
+        <p:style>
+          <a:lnRef idx="1">
+            <a:schemeClr val="accent1"/>
+          </a:lnRef>
+          <a:fillRef idx="0">
+            <a:schemeClr val="accent1"/>
+          </a:fillRef>
+          <a:effectRef idx="0">
+            <a:schemeClr val="accent1"/>
+          </a:effectRef>
+          <a:fontRef idx="minor">
+            <a:schemeClr val="tx1"/>
+          </a:fontRef>
+        </p:style>
+      </p:cxnSp>
+      <p:cxnSp>
+        <p:nvCxnSpPr>
+          <p:cNvPr id="29" name="Straight Connector 28">
+            <a:extLst>
+              <a:ext uri="{FF2B5EF4-FFF2-40B4-BE49-F238E27FC236}">
+                <a16:creationId xmlns:a16="http://schemas.microsoft.com/office/drawing/2014/main" id="{5EB3A36A-127A-4806-BE24-8A2964828EAD}"/>
+              </a:ext>
+            </a:extLst>
+          </p:cNvPr>
+          <p:cNvCxnSpPr>
+            <a:cxnSpLocks/>
+          </p:cNvCxnSpPr>
+          <p:nvPr/>
+        </p:nvCxnSpPr>
+        <p:spPr>
+          <a:xfrm flipH="1">
+            <a:off x="9113520" y="2243024"/>
+            <a:ext cx="211457" cy="393496"/>
+          </a:xfrm>
+          <a:prstGeom prst="line">
+            <a:avLst/>
+          </a:prstGeom>
+          <a:ln w="25400">
+            <a:solidFill>
+              <a:schemeClr val="tx1"/>
+            </a:solidFill>
+          </a:ln>
+        </p:spPr>
+        <p:style>
+          <a:lnRef idx="1">
+            <a:schemeClr val="accent1"/>
+          </a:lnRef>
+          <a:fillRef idx="0">
+            <a:schemeClr val="accent1"/>
+          </a:fillRef>
+          <a:effectRef idx="0">
+            <a:schemeClr val="accent1"/>
+          </a:effectRef>
+          <a:fontRef idx="minor">
+            <a:schemeClr val="tx1"/>
+          </a:fontRef>
+        </p:style>
+      </p:cxnSp>
+      <p:cxnSp>
+        <p:nvCxnSpPr>
+          <p:cNvPr id="34" name="Straight Connector 33">
+            <a:extLst>
+              <a:ext uri="{FF2B5EF4-FFF2-40B4-BE49-F238E27FC236}">
+                <a16:creationId xmlns:a16="http://schemas.microsoft.com/office/drawing/2014/main" id="{8793B612-AD1C-488C-A5E4-6335C2AEE4E3}"/>
+              </a:ext>
+            </a:extLst>
+          </p:cNvPr>
+          <p:cNvCxnSpPr>
+            <a:cxnSpLocks/>
+          </p:cNvCxnSpPr>
+          <p:nvPr/>
+        </p:nvCxnSpPr>
+        <p:spPr>
+          <a:xfrm>
+            <a:off x="9324974" y="1709737"/>
+            <a:ext cx="252096" cy="332423"/>
+          </a:xfrm>
+          <a:prstGeom prst="line">
+            <a:avLst/>
+          </a:prstGeom>
+          <a:ln w="25400">
+            <a:solidFill>
+              <a:schemeClr val="tx1"/>
+            </a:solidFill>
+          </a:ln>
+        </p:spPr>
+        <p:style>
+          <a:lnRef idx="1">
+            <a:schemeClr val="accent1"/>
+          </a:lnRef>
+          <a:fillRef idx="0">
+            <a:schemeClr val="accent1"/>
+          </a:fillRef>
+          <a:effectRef idx="0">
+            <a:schemeClr val="accent1"/>
+          </a:effectRef>
+          <a:fontRef idx="minor">
+            <a:schemeClr val="tx1"/>
+          </a:fontRef>
+        </p:style>
+      </p:cxnSp>
+      <p:cxnSp>
+        <p:nvCxnSpPr>
+          <p:cNvPr id="37" name="Straight Connector 36">
+            <a:extLst>
+              <a:ext uri="{FF2B5EF4-FFF2-40B4-BE49-F238E27FC236}">
+                <a16:creationId xmlns:a16="http://schemas.microsoft.com/office/drawing/2014/main" id="{77C70A42-BF9A-45AC-A10F-CFEBC8AD3971}"/>
+              </a:ext>
+            </a:extLst>
+          </p:cNvPr>
+          <p:cNvCxnSpPr>
+            <a:cxnSpLocks/>
+          </p:cNvCxnSpPr>
+          <p:nvPr/>
+        </p:nvCxnSpPr>
+        <p:spPr>
+          <a:xfrm flipH="1">
+            <a:off x="9072880" y="1709737"/>
+            <a:ext cx="252095" cy="332423"/>
+          </a:xfrm>
+          <a:prstGeom prst="line">
+            <a:avLst/>
+          </a:prstGeom>
+          <a:ln w="25400">
+            <a:solidFill>
+              <a:schemeClr val="tx1"/>
+            </a:solidFill>
+          </a:ln>
+        </p:spPr>
+        <p:style>
+          <a:lnRef idx="1">
+            <a:schemeClr val="accent1"/>
+          </a:lnRef>
+          <a:fillRef idx="0">
+            <a:schemeClr val="accent1"/>
+          </a:fillRef>
+          <a:effectRef idx="0">
+            <a:schemeClr val="accent1"/>
+          </a:effectRef>
+          <a:fontRef idx="minor">
+            <a:schemeClr val="tx1"/>
+          </a:fontRef>
+        </p:style>
+      </p:cxnSp>
+      <p:pic>
+        <p:nvPicPr>
+          <p:cNvPr id="50" name="Picture 49">
+            <a:extLst>
+              <a:ext uri="{FF2B5EF4-FFF2-40B4-BE49-F238E27FC236}">
+                <a16:creationId xmlns:a16="http://schemas.microsoft.com/office/drawing/2014/main" id="{1B108E44-EFED-4C39-828F-6CF521EAEADD}"/>
+              </a:ext>
+            </a:extLst>
+          </p:cNvPr>
+          <p:cNvPicPr>
+            <a:picLocks noChangeAspect="1"/>
+          </p:cNvPicPr>
+          <p:nvPr/>
+        </p:nvPicPr>
+        <p:blipFill>
+          <a:blip r:embed="rId2"/>
+          <a:stretch>
+            <a:fillRect/>
+          </a:stretch>
+        </p:blipFill>
+        <p:spPr>
+          <a:xfrm>
+            <a:off x="8959930" y="3093346"/>
+            <a:ext cx="536494" cy="1347333"/>
+          </a:xfrm>
+          <a:prstGeom prst="rect">
+            <a:avLst/>
+          </a:prstGeom>
+        </p:spPr>
+      </p:pic>
+      <p:cxnSp>
+        <p:nvCxnSpPr>
+          <p:cNvPr id="21" name="Straight Arrow Connector 20">
+            <a:extLst>
+              <a:ext uri="{FF2B5EF4-FFF2-40B4-BE49-F238E27FC236}">
+                <a16:creationId xmlns:a16="http://schemas.microsoft.com/office/drawing/2014/main" id="{D22A36C8-6F84-4DA1-A089-81425E6A7B60}"/>
+              </a:ext>
+            </a:extLst>
+          </p:cNvPr>
+          <p:cNvCxnSpPr>
+            <a:cxnSpLocks/>
+          </p:cNvCxnSpPr>
+          <p:nvPr/>
+        </p:nvCxnSpPr>
+        <p:spPr>
+          <a:xfrm>
+            <a:off x="4494276" y="4718050"/>
+            <a:ext cx="2961313" cy="0"/>
+          </a:xfrm>
+          <a:prstGeom prst="straightConnector1">
+            <a:avLst/>
+          </a:prstGeom>
+          <a:ln w="25400">
+            <a:solidFill>
+              <a:schemeClr val="tx1"/>
+            </a:solidFill>
+            <a:headEnd w="lg" len="med"/>
+            <a:tailEnd type="arrow" w="lg" len="lg"/>
+          </a:ln>
+        </p:spPr>
+        <p:style>
+          <a:lnRef idx="1">
+            <a:schemeClr val="accent1"/>
+          </a:lnRef>
+          <a:fillRef idx="0">
+            <a:schemeClr val="accent1"/>
+          </a:fillRef>
+          <a:effectRef idx="0">
+            <a:schemeClr val="accent1"/>
+          </a:effectRef>
+          <a:fontRef idx="minor">
+            <a:schemeClr val="tx1"/>
+          </a:fontRef>
+        </p:style>
+      </p:cxnSp>
+    </p:spTree>
+    <p:extLst>
+      <p:ext uri="{BB962C8B-B14F-4D97-AF65-F5344CB8AC3E}">
+        <p14:creationId xmlns:p14="http://schemas.microsoft.com/office/powerpoint/2010/main" val="2621100798"/>
+      </p:ext>
+    </p:extLst>
+  </p:cSld>
+  <p:clrMapOvr>
+    <a:masterClrMapping/>
+  </p:clrMapOvr>
+</p:sld>
+</file>
+
+<file path=ppt/slides/slide9.xml><?xml version="1.0" encoding="utf-8"?>
+<p:sld xmlns:a="http://schemas.openxmlformats.org/drawingml/2006/main" xmlns:r="http://schemas.openxmlformats.org/officeDocument/2006/relationships" xmlns:p="http://schemas.openxmlformats.org/presentationml/2006/main">
+  <p:cSld>
+    <p:spTree>
+      <p:nvGrpSpPr>
+        <p:cNvPr id="1" name=""/>
+        <p:cNvGrpSpPr/>
+        <p:nvPr/>
+      </p:nvGrpSpPr>
+      <p:grpSpPr>
+        <a:xfrm>
+          <a:off x="0" y="0"/>
+          <a:ext cx="0" cy="0"/>
+          <a:chOff x="0" y="0"/>
+          <a:chExt cx="0" cy="0"/>
+        </a:xfrm>
+      </p:grpSpPr>
+      <p:sp>
+        <p:nvSpPr>
+          <p:cNvPr id="4" name="Rectangle 3">
+            <a:extLst>
+              <a:ext uri="{FF2B5EF4-FFF2-40B4-BE49-F238E27FC236}">
+                <a16:creationId xmlns:a16="http://schemas.microsoft.com/office/drawing/2014/main" id="{380FFD06-977A-469E-9A6E-FDBB0B1D50BA}"/>
+              </a:ext>
+            </a:extLst>
+          </p:cNvPr>
+          <p:cNvSpPr/>
+          <p:nvPr/>
+        </p:nvSpPr>
+        <p:spPr>
+          <a:xfrm>
+            <a:off x="3923602" y="909071"/>
+            <a:ext cx="1269184" cy="483502"/>
+          </a:xfrm>
+          <a:prstGeom prst="rect">
+            <a:avLst/>
+          </a:prstGeom>
+          <a:solidFill>
+            <a:srgbClr val="CCCCFF"/>
+          </a:solidFill>
+          <a:ln w="25400">
+            <a:solidFill>
+              <a:srgbClr val="9464B7"/>
+            </a:solidFill>
+          </a:ln>
+        </p:spPr>
+        <p:style>
+          <a:lnRef idx="2">
+            <a:schemeClr val="accent1">
+              <a:shade val="50000"/>
+            </a:schemeClr>
+          </a:lnRef>
+          <a:fillRef idx="1">
+            <a:schemeClr val="accent1"/>
+          </a:fillRef>
+          <a:effectRef idx="0">
+            <a:schemeClr val="accent1"/>
+          </a:effectRef>
+          <a:fontRef idx="minor">
+            <a:schemeClr val="lt1"/>
+          </a:fontRef>
+        </p:style>
+        <p:txBody>
+          <a:bodyPr rtlCol="0" anchor="ctr"/>
+          <a:lstStyle/>
+          <a:p>
+            <a:pPr algn="ctr"/>
+            <a:r>
+              <a:rPr lang="en-MY" sz="1200" dirty="0">
+                <a:solidFill>
+                  <a:schemeClr val="tx1"/>
+                </a:solidFill>
+                <a:latin typeface="Arial" panose="020B0604020202020204" pitchFamily="34" charset="0"/>
+                <a:cs typeface="Arial" panose="020B0604020202020204" pitchFamily="34" charset="0"/>
+              </a:rPr>
+              <a:t>ModuleList</a:t>
+            </a:r>
+          </a:p>
+        </p:txBody>
+      </p:sp>
+      <p:sp>
+        <p:nvSpPr>
+          <p:cNvPr id="5" name="Rectangle 4">
+            <a:extLst>
+              <a:ext uri="{FF2B5EF4-FFF2-40B4-BE49-F238E27FC236}">
+                <a16:creationId xmlns:a16="http://schemas.microsoft.com/office/drawing/2014/main" id="{4A057330-F96C-4A6A-9BE1-ECE199C559FF}"/>
+              </a:ext>
+            </a:extLst>
+          </p:cNvPr>
+          <p:cNvSpPr/>
+          <p:nvPr/>
+        </p:nvSpPr>
+        <p:spPr>
+          <a:xfrm>
+            <a:off x="3923602" y="2277875"/>
+            <a:ext cx="1269184" cy="483502"/>
+          </a:xfrm>
+          <a:prstGeom prst="rect">
+            <a:avLst/>
+          </a:prstGeom>
+          <a:solidFill>
+            <a:srgbClr val="CCCCFF"/>
+          </a:solidFill>
+          <a:ln w="25400">
+            <a:solidFill>
+              <a:srgbClr val="9464B7"/>
+            </a:solidFill>
+          </a:ln>
+        </p:spPr>
+        <p:style>
+          <a:lnRef idx="2">
+            <a:schemeClr val="accent1">
+              <a:shade val="50000"/>
+            </a:schemeClr>
+          </a:lnRef>
+          <a:fillRef idx="1">
+            <a:schemeClr val="accent1"/>
+          </a:fillRef>
+          <a:effectRef idx="0">
+            <a:schemeClr val="accent1"/>
+          </a:effectRef>
+          <a:fontRef idx="minor">
+            <a:schemeClr val="lt1"/>
+          </a:fontRef>
+        </p:style>
+        <p:txBody>
+          <a:bodyPr rtlCol="0" anchor="ctr"/>
+          <a:lstStyle/>
+          <a:p>
+            <a:pPr algn="ctr"/>
+            <a:r>
+              <a:rPr lang="en-MY" sz="1200" dirty="0">
+                <a:solidFill>
+                  <a:schemeClr val="tx1"/>
+                </a:solidFill>
+                <a:latin typeface="Arial" panose="020B0604020202020204" pitchFamily="34" charset="0"/>
+                <a:cs typeface="Arial" panose="020B0604020202020204" pitchFamily="34" charset="0"/>
+              </a:rPr>
+              <a:t>Module</a:t>
+            </a:r>
+          </a:p>
+        </p:txBody>
+      </p:sp>
+      <p:sp>
+        <p:nvSpPr>
+          <p:cNvPr id="6" name="Rectangle 5">
+            <a:extLst>
+              <a:ext uri="{FF2B5EF4-FFF2-40B4-BE49-F238E27FC236}">
+                <a16:creationId xmlns:a16="http://schemas.microsoft.com/office/drawing/2014/main" id="{7A6251AA-9881-4B1B-A5EF-C4D62B140B77}"/>
+              </a:ext>
+            </a:extLst>
+          </p:cNvPr>
+          <p:cNvSpPr/>
+          <p:nvPr/>
+        </p:nvSpPr>
+        <p:spPr>
+          <a:xfrm>
+            <a:off x="5040227" y="4009506"/>
+            <a:ext cx="1269184" cy="483502"/>
+          </a:xfrm>
+          <a:prstGeom prst="rect">
+            <a:avLst/>
+          </a:prstGeom>
+          <a:solidFill>
+            <a:srgbClr val="CCCCFF"/>
+          </a:solidFill>
+          <a:ln w="25400">
+            <a:solidFill>
+              <a:srgbClr val="9464B7"/>
+            </a:solidFill>
+          </a:ln>
+        </p:spPr>
+        <p:style>
+          <a:lnRef idx="2">
+            <a:schemeClr val="accent1">
+              <a:shade val="50000"/>
+            </a:schemeClr>
+          </a:lnRef>
+          <a:fillRef idx="1">
+            <a:schemeClr val="accent1"/>
+          </a:fillRef>
+          <a:effectRef idx="0">
+            <a:schemeClr val="accent1"/>
+          </a:effectRef>
+          <a:fontRef idx="minor">
+            <a:schemeClr val="lt1"/>
+          </a:fontRef>
+        </p:style>
+        <p:txBody>
+          <a:bodyPr rtlCol="0" anchor="ctr"/>
+          <a:lstStyle/>
+          <a:p>
+            <a:pPr algn="ctr"/>
+            <a:r>
+              <a:rPr lang="en-MY" sz="1200" dirty="0">
+                <a:solidFill>
+                  <a:schemeClr val="tx1"/>
+                </a:solidFill>
+                <a:latin typeface="Arial" panose="020B0604020202020204" pitchFamily="34" charset="0"/>
+                <a:cs typeface="Arial" panose="020B0604020202020204" pitchFamily="34" charset="0"/>
+              </a:rPr>
+              <a:t>Task</a:t>
+            </a:r>
+          </a:p>
+        </p:txBody>
+      </p:sp>
+      <p:sp>
+        <p:nvSpPr>
+          <p:cNvPr id="7" name="Rectangle 6">
+            <a:extLst>
+              <a:ext uri="{FF2B5EF4-FFF2-40B4-BE49-F238E27FC236}">
+                <a16:creationId xmlns:a16="http://schemas.microsoft.com/office/drawing/2014/main" id="{5071C4AA-DC73-476A-B9FA-4E5B9CEEDE00}"/>
+              </a:ext>
+            </a:extLst>
+          </p:cNvPr>
+          <p:cNvSpPr/>
+          <p:nvPr/>
+        </p:nvSpPr>
+        <p:spPr>
+          <a:xfrm>
+            <a:off x="2664071" y="4005003"/>
+            <a:ext cx="1269184" cy="483502"/>
+          </a:xfrm>
+          <a:prstGeom prst="rect">
+            <a:avLst/>
+          </a:prstGeom>
+          <a:solidFill>
+            <a:srgbClr val="CCCCFF"/>
+          </a:solidFill>
+          <a:ln w="25400">
+            <a:solidFill>
+              <a:srgbClr val="9464B7"/>
+            </a:solidFill>
+          </a:ln>
+        </p:spPr>
+        <p:style>
+          <a:lnRef idx="2">
+            <a:schemeClr val="accent1">
+              <a:shade val="50000"/>
+            </a:schemeClr>
+          </a:lnRef>
+          <a:fillRef idx="1">
+            <a:schemeClr val="accent1"/>
+          </a:fillRef>
+          <a:effectRef idx="0">
+            <a:schemeClr val="accent1"/>
+          </a:effectRef>
+          <a:fontRef idx="minor">
+            <a:schemeClr val="lt1"/>
+          </a:fontRef>
+        </p:style>
+        <p:txBody>
+          <a:bodyPr rtlCol="0" anchor="ctr"/>
+          <a:lstStyle/>
+          <a:p>
+            <a:pPr algn="ctr"/>
+            <a:r>
+              <a:rPr lang="en-MY" sz="1200" dirty="0">
+                <a:solidFill>
+                  <a:schemeClr val="tx1"/>
+                </a:solidFill>
+                <a:latin typeface="Arial" panose="020B0604020202020204" pitchFamily="34" charset="0"/>
+                <a:cs typeface="Arial" panose="020B0604020202020204" pitchFamily="34" charset="0"/>
+              </a:rPr>
+              <a:t>Lesson</a:t>
+            </a:r>
+          </a:p>
+        </p:txBody>
+      </p:sp>
+      <p:sp>
+        <p:nvSpPr>
+          <p:cNvPr id="8" name="Rectangle 7">
+            <a:extLst>
+              <a:ext uri="{FF2B5EF4-FFF2-40B4-BE49-F238E27FC236}">
+                <a16:creationId xmlns:a16="http://schemas.microsoft.com/office/drawing/2014/main" id="{21FCA15F-6A78-4CA6-A870-DD1CE047FB67}"/>
+              </a:ext>
+            </a:extLst>
+          </p:cNvPr>
+          <p:cNvSpPr/>
+          <p:nvPr/>
+        </p:nvSpPr>
+        <p:spPr>
+          <a:xfrm>
+            <a:off x="2664071" y="5285163"/>
+            <a:ext cx="1269184" cy="483502"/>
+          </a:xfrm>
+          <a:prstGeom prst="rect">
+            <a:avLst/>
+          </a:prstGeom>
+          <a:solidFill>
+            <a:srgbClr val="CCCCFF"/>
+          </a:solidFill>
+          <a:ln w="25400">
+            <a:solidFill>
+              <a:srgbClr val="9464B7"/>
+            </a:solidFill>
+          </a:ln>
+        </p:spPr>
+        <p:style>
+          <a:lnRef idx="2">
+            <a:schemeClr val="accent1">
+              <a:shade val="50000"/>
+            </a:schemeClr>
+          </a:lnRef>
+          <a:fillRef idx="1">
+            <a:schemeClr val="accent1"/>
+          </a:fillRef>
+          <a:effectRef idx="0">
+            <a:schemeClr val="accent1"/>
+          </a:effectRef>
+          <a:fontRef idx="minor">
+            <a:schemeClr val="lt1"/>
+          </a:fontRef>
+        </p:style>
+        <p:txBody>
+          <a:bodyPr rtlCol="0" anchor="ctr"/>
+          <a:lstStyle/>
+          <a:p>
+            <a:pPr algn="ctr"/>
+            <a:r>
+              <a:rPr lang="en-MY" sz="1200" dirty="0">
+                <a:solidFill>
+                  <a:schemeClr val="tx1"/>
+                </a:solidFill>
+                <a:latin typeface="Arial" panose="020B0604020202020204" pitchFamily="34" charset="0"/>
+                <a:cs typeface="Arial" panose="020B0604020202020204" pitchFamily="34" charset="0"/>
+              </a:rPr>
+              <a:t>TeachingStaff</a:t>
+            </a:r>
+          </a:p>
+        </p:txBody>
+      </p:sp>
+      <p:sp>
+        <p:nvSpPr>
+          <p:cNvPr id="9" name="Rectangle 8">
+            <a:extLst>
+              <a:ext uri="{FF2B5EF4-FFF2-40B4-BE49-F238E27FC236}">
+                <a16:creationId xmlns:a16="http://schemas.microsoft.com/office/drawing/2014/main" id="{7E18CEDB-542E-4534-BF0F-03E2F2782603}"/>
+              </a:ext>
+            </a:extLst>
+          </p:cNvPr>
+          <p:cNvSpPr/>
+          <p:nvPr/>
+        </p:nvSpPr>
+        <p:spPr>
+          <a:xfrm>
+            <a:off x="964029" y="2761376"/>
+            <a:ext cx="1472967" cy="588099"/>
+          </a:xfrm>
+          <a:prstGeom prst="rect">
+            <a:avLst/>
+          </a:prstGeom>
+          <a:solidFill>
+            <a:srgbClr val="CCCCFF"/>
+          </a:solidFill>
+          <a:ln w="25400">
+            <a:solidFill>
+              <a:srgbClr val="9464B7"/>
+            </a:solidFill>
+          </a:ln>
+        </p:spPr>
+        <p:style>
+          <a:lnRef idx="2">
+            <a:schemeClr val="accent1">
+              <a:shade val="50000"/>
+            </a:schemeClr>
+          </a:lnRef>
+          <a:fillRef idx="1">
+            <a:schemeClr val="accent1"/>
+          </a:fillRef>
+          <a:effectRef idx="0">
+            <a:schemeClr val="accent1"/>
+          </a:effectRef>
+          <a:fontRef idx="minor">
+            <a:schemeClr val="lt1"/>
+          </a:fontRef>
+        </p:style>
+        <p:txBody>
+          <a:bodyPr rtlCol="0" anchor="ctr"/>
+          <a:lstStyle/>
+          <a:p>
+            <a:pPr algn="ctr"/>
+            <a:r>
+              <a:rPr lang="en-MY" sz="1200" dirty="0">
+                <a:solidFill>
+                  <a:schemeClr val="tx1"/>
+                </a:solidFill>
+                <a:latin typeface="Arial" panose="020B0604020202020204" pitchFamily="34" charset="0"/>
+                <a:cs typeface="Arial" panose="020B0604020202020204" pitchFamily="34" charset="0"/>
+              </a:rPr>
+              <a:t>&lt;&lt;enumeration&gt;&gt;</a:t>
+            </a:r>
+          </a:p>
+          <a:p>
+            <a:pPr algn="ctr"/>
+            <a:r>
+              <a:rPr lang="en-MY" sz="1200" dirty="0">
+                <a:solidFill>
+                  <a:schemeClr val="tx1"/>
+                </a:solidFill>
+                <a:latin typeface="Arial" panose="020B0604020202020204" pitchFamily="34" charset="0"/>
+                <a:cs typeface="Arial" panose="020B0604020202020204" pitchFamily="34" charset="0"/>
+              </a:rPr>
+              <a:t>LessonType</a:t>
+            </a:r>
+          </a:p>
+        </p:txBody>
+      </p:sp>
+      <p:cxnSp>
+        <p:nvCxnSpPr>
+          <p:cNvPr id="10" name="Straight Arrow Connector 9">
+            <a:extLst>
+              <a:ext uri="{FF2B5EF4-FFF2-40B4-BE49-F238E27FC236}">
+                <a16:creationId xmlns:a16="http://schemas.microsoft.com/office/drawing/2014/main" id="{BB4F40B4-7AC6-4C17-BD36-D1ED24C49D84}"/>
+              </a:ext>
+            </a:extLst>
+          </p:cNvPr>
+          <p:cNvCxnSpPr>
+            <a:cxnSpLocks/>
+            <a:stCxn id="4" idx="2"/>
+            <a:endCxn id="5" idx="0"/>
+          </p:cNvCxnSpPr>
+          <p:nvPr/>
+        </p:nvCxnSpPr>
+        <p:spPr>
+          <a:xfrm>
+            <a:off x="4558194" y="1392573"/>
+            <a:ext cx="0" cy="885302"/>
+          </a:xfrm>
+          <a:prstGeom prst="straightConnector1">
+            <a:avLst/>
+          </a:prstGeom>
+          <a:ln w="25400">
+            <a:solidFill>
+              <a:srgbClr val="895AB7"/>
+            </a:solidFill>
+            <a:tailEnd type="arrow" w="lg" len="lg"/>
+          </a:ln>
+        </p:spPr>
+        <p:style>
+          <a:lnRef idx="1">
+            <a:schemeClr val="accent1"/>
+          </a:lnRef>
+          <a:fillRef idx="0">
+            <a:schemeClr val="accent1"/>
+          </a:fillRef>
+          <a:effectRef idx="0">
+            <a:schemeClr val="accent1"/>
+          </a:effectRef>
+          <a:fontRef idx="minor">
+            <a:schemeClr val="tx1"/>
+          </a:fontRef>
+        </p:style>
+      </p:cxnSp>
+      <p:sp>
+        <p:nvSpPr>
+          <p:cNvPr id="17" name="Rectangle 16">
+            <a:extLst>
+              <a:ext uri="{FF2B5EF4-FFF2-40B4-BE49-F238E27FC236}">
+                <a16:creationId xmlns:a16="http://schemas.microsoft.com/office/drawing/2014/main" id="{8EBD1069-AB94-4043-BC1F-210D55950DB3}"/>
+              </a:ext>
+            </a:extLst>
+          </p:cNvPr>
+          <p:cNvSpPr>
+            <a:spLocks noChangeAspect="1"/>
+          </p:cNvSpPr>
+          <p:nvPr/>
+        </p:nvSpPr>
+        <p:spPr>
+          <a:xfrm rot="18763772">
+            <a:off x="4490801" y="1418425"/>
+            <a:ext cx="134786" cy="134786"/>
+          </a:xfrm>
+          <a:prstGeom prst="rect">
+            <a:avLst/>
+          </a:prstGeom>
+          <a:solidFill>
+            <a:srgbClr val="895AB7"/>
+          </a:solidFill>
+          <a:ln>
+            <a:noFill/>
+          </a:ln>
+        </p:spPr>
+        <p:style>
+          <a:lnRef idx="2">
+            <a:schemeClr val="accent1">
+              <a:shade val="50000"/>
+            </a:schemeClr>
+          </a:lnRef>
+          <a:fillRef idx="1">
+            <a:schemeClr val="accent1"/>
+          </a:fillRef>
+          <a:effectRef idx="0">
+            <a:schemeClr val="accent1"/>
+          </a:effectRef>
+          <a:fontRef idx="minor">
+            <a:schemeClr val="lt1"/>
+          </a:fontRef>
+        </p:style>
+        <p:txBody>
+          <a:bodyPr rtlCol="0" anchor="ctr"/>
+          <a:lstStyle/>
+          <a:p>
+            <a:pPr algn="ctr"/>
+            <a:endParaRPr lang="en-MY"/>
+          </a:p>
+        </p:txBody>
+      </p:sp>
+      <p:sp>
+        <p:nvSpPr>
+          <p:cNvPr id="18" name="TextBox 17">
+            <a:extLst>
+              <a:ext uri="{FF2B5EF4-FFF2-40B4-BE49-F238E27FC236}">
+                <a16:creationId xmlns:a16="http://schemas.microsoft.com/office/drawing/2014/main" id="{E213964C-E4BA-48FE-A0CA-71993BD078BF}"/>
+              </a:ext>
+            </a:extLst>
+          </p:cNvPr>
+          <p:cNvSpPr txBox="1"/>
+          <p:nvPr/>
+        </p:nvSpPr>
+        <p:spPr>
+          <a:xfrm>
+            <a:off x="4651155" y="1442039"/>
+            <a:ext cx="302118" cy="261610"/>
+          </a:xfrm>
+          <a:prstGeom prst="rect">
+            <a:avLst/>
+          </a:prstGeom>
+          <a:noFill/>
+        </p:spPr>
+        <p:txBody>
+          <a:bodyPr wrap="square" rtlCol="0">
+            <a:spAutoFit/>
+          </a:bodyPr>
+          <a:lstStyle/>
+          <a:p>
+            <a:r>
+              <a:rPr lang="en-MY" sz="1100" dirty="0">
+                <a:latin typeface="Arial" panose="020B0604020202020204" pitchFamily="34" charset="0"/>
+                <a:cs typeface="Arial" panose="020B0604020202020204" pitchFamily="34" charset="0"/>
+              </a:rPr>
+              <a:t>1</a:t>
+            </a:r>
+          </a:p>
+        </p:txBody>
+      </p:sp>
+      <p:sp>
+        <p:nvSpPr>
+          <p:cNvPr id="19" name="TextBox 18">
+            <a:extLst>
+              <a:ext uri="{FF2B5EF4-FFF2-40B4-BE49-F238E27FC236}">
+                <a16:creationId xmlns:a16="http://schemas.microsoft.com/office/drawing/2014/main" id="{A78D72FD-24CF-4B88-8209-6DE4FA633B20}"/>
+              </a:ext>
+            </a:extLst>
+          </p:cNvPr>
+          <p:cNvSpPr txBox="1"/>
+          <p:nvPr/>
+        </p:nvSpPr>
+        <p:spPr>
+          <a:xfrm>
+            <a:off x="4654562" y="1995750"/>
+            <a:ext cx="392759" cy="261610"/>
+          </a:xfrm>
+          <a:prstGeom prst="rect">
+            <a:avLst/>
+          </a:prstGeom>
+          <a:noFill/>
+        </p:spPr>
+        <p:txBody>
+          <a:bodyPr wrap="square" rtlCol="0">
+            <a:spAutoFit/>
+          </a:bodyPr>
+          <a:lstStyle/>
+          <a:p>
+            <a:r>
+              <a:rPr lang="en-MY" sz="1100" dirty="0">
+                <a:latin typeface="Arial" panose="020B0604020202020204" pitchFamily="34" charset="0"/>
+                <a:cs typeface="Arial" panose="020B0604020202020204" pitchFamily="34" charset="0"/>
+              </a:rPr>
+              <a:t>*</a:t>
+            </a:r>
+          </a:p>
+        </p:txBody>
+      </p:sp>
+      <p:sp>
+        <p:nvSpPr>
+          <p:cNvPr id="22" name="Rectangle 21">
+            <a:extLst>
+              <a:ext uri="{FF2B5EF4-FFF2-40B4-BE49-F238E27FC236}">
+                <a16:creationId xmlns:a16="http://schemas.microsoft.com/office/drawing/2014/main" id="{1FA96E91-1F87-4D7E-835D-FEBAEEF8D1C0}"/>
+              </a:ext>
+            </a:extLst>
+          </p:cNvPr>
+          <p:cNvSpPr>
+            <a:spLocks noChangeAspect="1"/>
+          </p:cNvSpPr>
+          <p:nvPr/>
+        </p:nvSpPr>
+        <p:spPr>
+          <a:xfrm rot="18763772">
+            <a:off x="4195270" y="2789217"/>
+            <a:ext cx="134786" cy="134786"/>
+          </a:xfrm>
+          <a:prstGeom prst="rect">
+            <a:avLst/>
+          </a:prstGeom>
+          <a:solidFill>
+            <a:srgbClr val="895AB7"/>
+          </a:solidFill>
+          <a:ln>
+            <a:noFill/>
+          </a:ln>
+        </p:spPr>
+        <p:style>
+          <a:lnRef idx="2">
+            <a:schemeClr val="accent1">
+              <a:shade val="50000"/>
+            </a:schemeClr>
+          </a:lnRef>
+          <a:fillRef idx="1">
+            <a:schemeClr val="accent1"/>
+          </a:fillRef>
+          <a:effectRef idx="0">
+            <a:schemeClr val="accent1"/>
+          </a:effectRef>
+          <a:fontRef idx="minor">
+            <a:schemeClr val="lt1"/>
+          </a:fontRef>
+        </p:style>
+        <p:txBody>
+          <a:bodyPr rtlCol="0" anchor="ctr"/>
+          <a:lstStyle/>
+          <a:p>
+            <a:pPr algn="ctr"/>
+            <a:endParaRPr lang="en-MY"/>
+          </a:p>
+        </p:txBody>
+      </p:sp>
+      <p:cxnSp>
+        <p:nvCxnSpPr>
+          <p:cNvPr id="42" name="Connector: Elbow 41">
+            <a:extLst>
+              <a:ext uri="{FF2B5EF4-FFF2-40B4-BE49-F238E27FC236}">
+                <a16:creationId xmlns:a16="http://schemas.microsoft.com/office/drawing/2014/main" id="{B204CDB6-6C0C-4C27-A2BC-C2F3AE96E9F7}"/>
+              </a:ext>
+            </a:extLst>
+          </p:cNvPr>
+          <p:cNvCxnSpPr>
+            <a:cxnSpLocks/>
+            <a:endCxn id="7" idx="0"/>
+          </p:cNvCxnSpPr>
+          <p:nvPr/>
+        </p:nvCxnSpPr>
+        <p:spPr>
+          <a:xfrm rot="5400000">
+            <a:off x="3166025" y="2908364"/>
+            <a:ext cx="1229278" cy="964001"/>
+          </a:xfrm>
+          <a:prstGeom prst="bentConnector3">
+            <a:avLst>
+              <a:gd name="adj1" fmla="val 50000"/>
+            </a:avLst>
+          </a:prstGeom>
+          <a:ln w="25400">
+            <a:solidFill>
+              <a:srgbClr val="895AB7"/>
+            </a:solidFill>
+            <a:tailEnd type="arrow" w="lg" len="lg"/>
+          </a:ln>
+        </p:spPr>
+        <p:style>
+          <a:lnRef idx="1">
+            <a:schemeClr val="accent1"/>
+          </a:lnRef>
+          <a:fillRef idx="0">
+            <a:schemeClr val="accent1"/>
+          </a:fillRef>
+          <a:effectRef idx="0">
+            <a:schemeClr val="accent1"/>
+          </a:effectRef>
+          <a:fontRef idx="minor">
+            <a:schemeClr val="tx1"/>
+          </a:fontRef>
+        </p:style>
+      </p:cxnSp>
+      <p:sp>
+        <p:nvSpPr>
+          <p:cNvPr id="47" name="TextBox 46">
+            <a:extLst>
+              <a:ext uri="{FF2B5EF4-FFF2-40B4-BE49-F238E27FC236}">
+                <a16:creationId xmlns:a16="http://schemas.microsoft.com/office/drawing/2014/main" id="{05636175-0FEF-4CCE-88A3-D4A893EB6907}"/>
+              </a:ext>
+            </a:extLst>
+          </p:cNvPr>
+          <p:cNvSpPr txBox="1"/>
+          <p:nvPr/>
+        </p:nvSpPr>
+        <p:spPr>
+          <a:xfrm>
+            <a:off x="4249295" y="2799859"/>
+            <a:ext cx="302118" cy="261610"/>
+          </a:xfrm>
+          <a:prstGeom prst="rect">
+            <a:avLst/>
+          </a:prstGeom>
+          <a:noFill/>
+        </p:spPr>
+        <p:txBody>
+          <a:bodyPr wrap="square" rtlCol="0">
+            <a:spAutoFit/>
+          </a:bodyPr>
+          <a:lstStyle/>
+          <a:p>
+            <a:r>
+              <a:rPr lang="en-MY" sz="1100" dirty="0">
+                <a:latin typeface="Arial" panose="020B0604020202020204" pitchFamily="34" charset="0"/>
+                <a:cs typeface="Arial" panose="020B0604020202020204" pitchFamily="34" charset="0"/>
+              </a:rPr>
+              <a:t>1</a:t>
+            </a:r>
+          </a:p>
+        </p:txBody>
+      </p:sp>
+      <p:sp>
+        <p:nvSpPr>
+          <p:cNvPr id="48" name="TextBox 47">
+            <a:extLst>
+              <a:ext uri="{FF2B5EF4-FFF2-40B4-BE49-F238E27FC236}">
+                <a16:creationId xmlns:a16="http://schemas.microsoft.com/office/drawing/2014/main" id="{855CFC27-22E0-432B-B555-9D12C9A064C1}"/>
+              </a:ext>
+            </a:extLst>
+          </p:cNvPr>
+          <p:cNvSpPr txBox="1"/>
+          <p:nvPr/>
+        </p:nvSpPr>
+        <p:spPr>
+          <a:xfrm>
+            <a:off x="2966189" y="3645404"/>
+            <a:ext cx="284736" cy="261610"/>
+          </a:xfrm>
+          <a:prstGeom prst="rect">
+            <a:avLst/>
+          </a:prstGeom>
+          <a:noFill/>
+        </p:spPr>
+        <p:txBody>
+          <a:bodyPr wrap="square" rtlCol="0">
+            <a:spAutoFit/>
+          </a:bodyPr>
+          <a:lstStyle/>
+          <a:p>
+            <a:pPr algn="ctr"/>
+            <a:r>
+              <a:rPr lang="en-MY" sz="1100" dirty="0">
+                <a:latin typeface="Arial" panose="020B0604020202020204" pitchFamily="34" charset="0"/>
+                <a:cs typeface="Arial" panose="020B0604020202020204" pitchFamily="34" charset="0"/>
+              </a:rPr>
+              <a:t>*</a:t>
+            </a:r>
+          </a:p>
+        </p:txBody>
+      </p:sp>
+      <p:cxnSp>
+        <p:nvCxnSpPr>
+          <p:cNvPr id="49" name="Connector: Elbow 48">
+            <a:extLst>
+              <a:ext uri="{FF2B5EF4-FFF2-40B4-BE49-F238E27FC236}">
+                <a16:creationId xmlns:a16="http://schemas.microsoft.com/office/drawing/2014/main" id="{10163BDC-A3DF-49D0-BF4E-8F7D4D3C6722}"/>
+              </a:ext>
+            </a:extLst>
+          </p:cNvPr>
+          <p:cNvCxnSpPr>
+            <a:cxnSpLocks/>
+            <a:endCxn id="6" idx="0"/>
+          </p:cNvCxnSpPr>
+          <p:nvPr/>
+        </p:nvCxnSpPr>
+        <p:spPr>
+          <a:xfrm rot="16200000" flipH="1">
+            <a:off x="4669147" y="3003833"/>
+            <a:ext cx="1233781" cy="777563"/>
+          </a:xfrm>
+          <a:prstGeom prst="bentConnector3">
+            <a:avLst>
+              <a:gd name="adj1" fmla="val 50000"/>
+            </a:avLst>
+          </a:prstGeom>
+          <a:ln w="25400">
+            <a:solidFill>
+              <a:srgbClr val="895AB7"/>
+            </a:solidFill>
+            <a:tailEnd type="arrow" w="lg" len="lg"/>
+          </a:ln>
+        </p:spPr>
+        <p:style>
+          <a:lnRef idx="1">
+            <a:schemeClr val="accent1"/>
+          </a:lnRef>
+          <a:fillRef idx="0">
+            <a:schemeClr val="accent1"/>
+          </a:fillRef>
+          <a:effectRef idx="0">
+            <a:schemeClr val="accent1"/>
+          </a:effectRef>
+          <a:fontRef idx="minor">
+            <a:schemeClr val="tx1"/>
+          </a:fontRef>
+        </p:style>
+      </p:cxnSp>
+      <p:sp>
+        <p:nvSpPr>
+          <p:cNvPr id="56" name="TextBox 55">
+            <a:extLst>
+              <a:ext uri="{FF2B5EF4-FFF2-40B4-BE49-F238E27FC236}">
+                <a16:creationId xmlns:a16="http://schemas.microsoft.com/office/drawing/2014/main" id="{EFECC81D-0829-40B7-A3AC-FE7325A1F5BE}"/>
+              </a:ext>
+            </a:extLst>
+          </p:cNvPr>
+          <p:cNvSpPr txBox="1"/>
+          <p:nvPr/>
+        </p:nvSpPr>
+        <p:spPr>
+          <a:xfrm>
+            <a:off x="5703241" y="3645404"/>
+            <a:ext cx="392759" cy="261610"/>
+          </a:xfrm>
+          <a:prstGeom prst="rect">
+            <a:avLst/>
+          </a:prstGeom>
+          <a:noFill/>
+        </p:spPr>
+        <p:txBody>
+          <a:bodyPr wrap="square" rtlCol="0">
+            <a:spAutoFit/>
+          </a:bodyPr>
+          <a:lstStyle/>
+          <a:p>
+            <a:pPr algn="ctr"/>
+            <a:r>
+              <a:rPr lang="en-MY" sz="1100" dirty="0">
+                <a:latin typeface="Arial" panose="020B0604020202020204" pitchFamily="34" charset="0"/>
+                <a:cs typeface="Arial" panose="020B0604020202020204" pitchFamily="34" charset="0"/>
+              </a:rPr>
+              <a:t>*</a:t>
+            </a:r>
+          </a:p>
+        </p:txBody>
+      </p:sp>
+      <p:cxnSp>
+        <p:nvCxnSpPr>
+          <p:cNvPr id="57" name="Straight Arrow Connector 56">
+            <a:extLst>
+              <a:ext uri="{FF2B5EF4-FFF2-40B4-BE49-F238E27FC236}">
+                <a16:creationId xmlns:a16="http://schemas.microsoft.com/office/drawing/2014/main" id="{43C8B31D-4C3F-4E6A-B0D7-B6E00F7F9012}"/>
+              </a:ext>
+            </a:extLst>
+          </p:cNvPr>
+          <p:cNvCxnSpPr>
+            <a:cxnSpLocks/>
+            <a:stCxn id="7" idx="2"/>
+            <a:endCxn id="8" idx="0"/>
+          </p:cNvCxnSpPr>
+          <p:nvPr/>
+        </p:nvCxnSpPr>
+        <p:spPr>
+          <a:xfrm>
+            <a:off x="3298663" y="4488505"/>
+            <a:ext cx="0" cy="796658"/>
+          </a:xfrm>
+          <a:prstGeom prst="straightConnector1">
+            <a:avLst/>
+          </a:prstGeom>
+          <a:ln w="25400">
+            <a:solidFill>
+              <a:srgbClr val="895AB7"/>
+            </a:solidFill>
+            <a:tailEnd type="arrow" w="lg" len="lg"/>
+          </a:ln>
+        </p:spPr>
+        <p:style>
+          <a:lnRef idx="1">
+            <a:schemeClr val="accent1"/>
+          </a:lnRef>
+          <a:fillRef idx="0">
+            <a:schemeClr val="accent1"/>
+          </a:fillRef>
+          <a:effectRef idx="0">
+            <a:schemeClr val="accent1"/>
+          </a:effectRef>
+          <a:fontRef idx="minor">
+            <a:schemeClr val="tx1"/>
+          </a:fontRef>
+        </p:style>
+      </p:cxnSp>
+      <p:sp>
+        <p:nvSpPr>
+          <p:cNvPr id="58" name="Rectangle 57">
+            <a:extLst>
+              <a:ext uri="{FF2B5EF4-FFF2-40B4-BE49-F238E27FC236}">
+                <a16:creationId xmlns:a16="http://schemas.microsoft.com/office/drawing/2014/main" id="{25932359-50C7-49C8-8CED-146A26B26F98}"/>
+              </a:ext>
+            </a:extLst>
+          </p:cNvPr>
+          <p:cNvSpPr>
+            <a:spLocks noChangeAspect="1"/>
+          </p:cNvSpPr>
+          <p:nvPr/>
+        </p:nvSpPr>
+        <p:spPr>
+          <a:xfrm rot="18763772">
+            <a:off x="3231269" y="4516344"/>
+            <a:ext cx="134786" cy="134786"/>
+          </a:xfrm>
+          <a:prstGeom prst="rect">
+            <a:avLst/>
+          </a:prstGeom>
+          <a:solidFill>
+            <a:srgbClr val="895AB7"/>
+          </a:solidFill>
+          <a:ln>
+            <a:noFill/>
+          </a:ln>
+        </p:spPr>
+        <p:style>
+          <a:lnRef idx="2">
+            <a:schemeClr val="accent1">
+              <a:shade val="50000"/>
+            </a:schemeClr>
+          </a:lnRef>
+          <a:fillRef idx="1">
+            <a:schemeClr val="accent1"/>
+          </a:fillRef>
+          <a:effectRef idx="0">
+            <a:schemeClr val="accent1"/>
+          </a:effectRef>
+          <a:fontRef idx="minor">
+            <a:schemeClr val="lt1"/>
+          </a:fontRef>
+        </p:style>
+        <p:txBody>
+          <a:bodyPr rtlCol="0" anchor="ctr"/>
+          <a:lstStyle/>
+          <a:p>
+            <a:pPr algn="ctr"/>
+            <a:endParaRPr lang="en-MY"/>
+          </a:p>
+        </p:txBody>
+      </p:sp>
+      <p:sp>
+        <p:nvSpPr>
+          <p:cNvPr id="59" name="TextBox 58">
+            <a:extLst>
+              <a:ext uri="{FF2B5EF4-FFF2-40B4-BE49-F238E27FC236}">
+                <a16:creationId xmlns:a16="http://schemas.microsoft.com/office/drawing/2014/main" id="{72B0855B-4182-4B6B-9711-83BAB2F1DA4A}"/>
+              </a:ext>
+            </a:extLst>
+          </p:cNvPr>
+          <p:cNvSpPr txBox="1"/>
+          <p:nvPr/>
+        </p:nvSpPr>
+        <p:spPr>
+          <a:xfrm>
+            <a:off x="3393896" y="4525705"/>
+            <a:ext cx="302118" cy="261610"/>
+          </a:xfrm>
+          <a:prstGeom prst="rect">
+            <a:avLst/>
+          </a:prstGeom>
+          <a:noFill/>
+        </p:spPr>
+        <p:txBody>
+          <a:bodyPr wrap="square" rtlCol="0">
+            <a:spAutoFit/>
+          </a:bodyPr>
+          <a:lstStyle/>
+          <a:p>
+            <a:r>
+              <a:rPr lang="en-MY" sz="1100" dirty="0">
+                <a:latin typeface="Arial" panose="020B0604020202020204" pitchFamily="34" charset="0"/>
+                <a:cs typeface="Arial" panose="020B0604020202020204" pitchFamily="34" charset="0"/>
+              </a:rPr>
+              <a:t>1</a:t>
+            </a:r>
+          </a:p>
+        </p:txBody>
+      </p:sp>
+      <p:sp>
+        <p:nvSpPr>
+          <p:cNvPr id="60" name="TextBox 59">
+            <a:extLst>
+              <a:ext uri="{FF2B5EF4-FFF2-40B4-BE49-F238E27FC236}">
+                <a16:creationId xmlns:a16="http://schemas.microsoft.com/office/drawing/2014/main" id="{7C20FB0F-25D4-4F5F-8076-DFFBB900EFB1}"/>
+              </a:ext>
+            </a:extLst>
+          </p:cNvPr>
+          <p:cNvSpPr txBox="1"/>
+          <p:nvPr/>
+        </p:nvSpPr>
+        <p:spPr>
+          <a:xfrm>
+            <a:off x="3389309" y="5031665"/>
+            <a:ext cx="534292" cy="261610"/>
+          </a:xfrm>
+          <a:prstGeom prst="rect">
+            <a:avLst/>
+          </a:prstGeom>
+          <a:noFill/>
+        </p:spPr>
+        <p:txBody>
+          <a:bodyPr wrap="square" rtlCol="0">
+            <a:spAutoFit/>
+          </a:bodyPr>
+          <a:lstStyle/>
+          <a:p>
+            <a:r>
+              <a:rPr lang="en-MY" sz="1100" dirty="0">
+                <a:latin typeface="Arial" panose="020B0604020202020204" pitchFamily="34" charset="0"/>
+                <a:cs typeface="Arial" panose="020B0604020202020204" pitchFamily="34" charset="0"/>
+              </a:rPr>
+              <a:t>0..1</a:t>
+            </a:r>
+          </a:p>
+        </p:txBody>
+      </p:sp>
+      <p:sp>
+        <p:nvSpPr>
+          <p:cNvPr id="66" name="Rectangle 65">
+            <a:extLst>
+              <a:ext uri="{FF2B5EF4-FFF2-40B4-BE49-F238E27FC236}">
+                <a16:creationId xmlns:a16="http://schemas.microsoft.com/office/drawing/2014/main" id="{22659BEC-EEB2-4045-AF1B-E231A2448666}"/>
+              </a:ext>
+            </a:extLst>
+          </p:cNvPr>
+          <p:cNvSpPr>
+            <a:spLocks noChangeAspect="1"/>
+          </p:cNvSpPr>
+          <p:nvPr/>
+        </p:nvSpPr>
+        <p:spPr>
+          <a:xfrm rot="18812294">
+            <a:off x="4829666" y="2794037"/>
+            <a:ext cx="134786" cy="134786"/>
+          </a:xfrm>
+          <a:prstGeom prst="rect">
+            <a:avLst/>
+          </a:prstGeom>
+          <a:solidFill>
+            <a:srgbClr val="895AB7"/>
+          </a:solidFill>
+          <a:ln>
+            <a:noFill/>
+          </a:ln>
+        </p:spPr>
+        <p:style>
+          <a:lnRef idx="2">
+            <a:schemeClr val="accent1">
+              <a:shade val="50000"/>
+            </a:schemeClr>
+          </a:lnRef>
+          <a:fillRef idx="1">
+            <a:schemeClr val="accent1"/>
+          </a:fillRef>
+          <a:effectRef idx="0">
+            <a:schemeClr val="accent1"/>
+          </a:effectRef>
+          <a:fontRef idx="minor">
+            <a:schemeClr val="lt1"/>
+          </a:fontRef>
+        </p:style>
+        <p:txBody>
+          <a:bodyPr rtlCol="0" anchor="ctr"/>
+          <a:lstStyle/>
+          <a:p>
+            <a:pPr algn="ctr"/>
+            <a:endParaRPr lang="en-MY"/>
+          </a:p>
+        </p:txBody>
+      </p:sp>
+      <p:cxnSp>
+        <p:nvCxnSpPr>
+          <p:cNvPr id="67" name="Connector: Elbow 66">
+            <a:extLst>
+              <a:ext uri="{FF2B5EF4-FFF2-40B4-BE49-F238E27FC236}">
+                <a16:creationId xmlns:a16="http://schemas.microsoft.com/office/drawing/2014/main" id="{97C80379-57AC-4469-9A69-3DE3FEAF0290}"/>
+              </a:ext>
+            </a:extLst>
+          </p:cNvPr>
+          <p:cNvCxnSpPr>
+            <a:cxnSpLocks/>
+            <a:stCxn id="7" idx="1"/>
+            <a:endCxn id="9" idx="2"/>
+          </p:cNvCxnSpPr>
+          <p:nvPr/>
+        </p:nvCxnSpPr>
+        <p:spPr>
+          <a:xfrm rot="10800000">
+            <a:off x="1700513" y="3349476"/>
+            <a:ext cx="963558" cy="897279"/>
+          </a:xfrm>
+          <a:prstGeom prst="bentConnector2">
+            <a:avLst/>
+          </a:prstGeom>
+          <a:ln w="25400">
+            <a:solidFill>
+              <a:srgbClr val="895AB7"/>
+            </a:solidFill>
+            <a:tailEnd type="arrow" w="lg" len="lg"/>
+          </a:ln>
+        </p:spPr>
+        <p:style>
+          <a:lnRef idx="1">
+            <a:schemeClr val="accent1"/>
+          </a:lnRef>
+          <a:fillRef idx="0">
+            <a:schemeClr val="accent1"/>
+          </a:fillRef>
+          <a:effectRef idx="0">
+            <a:schemeClr val="accent1"/>
+          </a:effectRef>
+          <a:fontRef idx="minor">
+            <a:schemeClr val="tx1"/>
+          </a:fontRef>
+        </p:style>
+      </p:cxnSp>
+      <p:sp>
+        <p:nvSpPr>
+          <p:cNvPr id="71" name="TextBox 70">
+            <a:extLst>
+              <a:ext uri="{FF2B5EF4-FFF2-40B4-BE49-F238E27FC236}">
+                <a16:creationId xmlns:a16="http://schemas.microsoft.com/office/drawing/2014/main" id="{4545456D-9BF3-4D1C-B9EA-CBB28357BFD7}"/>
+              </a:ext>
+            </a:extLst>
+          </p:cNvPr>
+          <p:cNvSpPr txBox="1"/>
+          <p:nvPr/>
+        </p:nvSpPr>
+        <p:spPr>
+          <a:xfrm>
+            <a:off x="1398394" y="3383794"/>
+            <a:ext cx="302118" cy="261610"/>
+          </a:xfrm>
+          <a:prstGeom prst="rect">
+            <a:avLst/>
+          </a:prstGeom>
+          <a:noFill/>
+        </p:spPr>
+        <p:txBody>
+          <a:bodyPr wrap="square" rtlCol="0">
+            <a:spAutoFit/>
+          </a:bodyPr>
+          <a:lstStyle/>
+          <a:p>
+            <a:r>
+              <a:rPr lang="en-MY" sz="1100" dirty="0">
+                <a:latin typeface="Arial" panose="020B0604020202020204" pitchFamily="34" charset="0"/>
+                <a:cs typeface="Arial" panose="020B0604020202020204" pitchFamily="34" charset="0"/>
+              </a:rPr>
+              <a:t>1</a:t>
+            </a:r>
+          </a:p>
+        </p:txBody>
+      </p:sp>
+      <p:sp>
+        <p:nvSpPr>
+          <p:cNvPr id="27" name="TextBox 26">
+            <a:extLst>
+              <a:ext uri="{FF2B5EF4-FFF2-40B4-BE49-F238E27FC236}">
+                <a16:creationId xmlns:a16="http://schemas.microsoft.com/office/drawing/2014/main" id="{80180AB4-C8AB-445E-A39C-5B864EAAEFB6}"/>
+              </a:ext>
+            </a:extLst>
+          </p:cNvPr>
+          <p:cNvSpPr txBox="1"/>
+          <p:nvPr/>
+        </p:nvSpPr>
+        <p:spPr>
+          <a:xfrm>
+            <a:off x="4927553" y="2789512"/>
+            <a:ext cx="302118" cy="261610"/>
+          </a:xfrm>
+          <a:prstGeom prst="rect">
+            <a:avLst/>
+          </a:prstGeom>
+          <a:noFill/>
+        </p:spPr>
+        <p:txBody>
+          <a:bodyPr wrap="square" rtlCol="0">
+            <a:spAutoFit/>
+          </a:bodyPr>
+          <a:lstStyle/>
+          <a:p>
+            <a:r>
+              <a:rPr lang="en-MY" sz="1100" dirty="0">
+                <a:latin typeface="Arial" panose="020B0604020202020204" pitchFamily="34" charset="0"/>
+                <a:cs typeface="Arial" panose="020B0604020202020204" pitchFamily="34" charset="0"/>
+              </a:rPr>
+              <a:t>1</a:t>
+            </a:r>
+          </a:p>
+        </p:txBody>
+      </p:sp>
+    </p:spTree>
+    <p:extLst>
+      <p:ext uri="{BB962C8B-B14F-4D97-AF65-F5344CB8AC3E}">
+        <p14:creationId xmlns:p14="http://schemas.microsoft.com/office/powerpoint/2010/main" val="126408866"/>
+      </p:ext>
+    </p:extLst>
+  </p:cSld>
+  <p:clrMapOvr>
+    <a:masterClrMapping/>
+  </p:clrMapOvr>
+</p:sld>
+</file>
+
 <file path=ppt/theme/theme1.xml><?xml version="1.0" encoding="utf-8"?>
 <a:theme xmlns:a="http://schemas.openxmlformats.org/drawingml/2006/main" name="Office Theme">
   <a:themeElements>

</xml_diff>